<commit_message>
fixed color sensor lesson
</commit_message>
<xml_diff>
--- a/translations/en/lessons/ColorSensor.pptx
+++ b/translations/en/lessons/ColorSensor.pptx
@@ -219,7 +219,7 @@
           <a:p>
             <a:fld id="{58040048-1E4D-CD41-AC49-0750EB72586B}" type="datetimeFigureOut">
               <a:rPr lang="en-US" smtClean="0"/>
-              <a:t>01/08/2020</a:t>
+              <a:t>6/9/2020</a:t>
             </a:fld>
             <a:endParaRPr lang="en-US"/>
           </a:p>
@@ -385,7 +385,7 @@
           <a:p>
             <a:fld id="{2B8484CF-5098-F24E-8881-583515D5C406}" type="datetimeFigureOut">
               <a:rPr lang="en-US" smtClean="0"/>
-              <a:t>01/08/2020</a:t>
+              <a:t>6/9/2020</a:t>
             </a:fld>
             <a:endParaRPr lang="en-US"/>
           </a:p>
@@ -7544,10 +7544,10 @@
       </p:grpSpPr>
       <p:pic>
         <p:nvPicPr>
-          <p:cNvPr id="6" name="Picture 5">
+          <p:cNvPr id="8" name="Picture 7" descr="A screenshot of a cell phone&#10;&#10;Description automatically generated">
             <a:extLst>
               <a:ext uri="{FF2B5EF4-FFF2-40B4-BE49-F238E27FC236}">
-                <a16:creationId xmlns:a16="http://schemas.microsoft.com/office/drawing/2014/main" id="{1F5FE7F0-2AEA-4ACA-A7C6-727833157D47}"/>
+                <a16:creationId xmlns:a16="http://schemas.microsoft.com/office/drawing/2014/main" id="{5E9B7CE4-180D-4CD3-B755-37B835D24019}"/>
               </a:ext>
             </a:extLst>
           </p:cNvPr>
@@ -7564,8 +7564,8 @@
         </p:blipFill>
         <p:spPr>
           <a:xfrm>
-            <a:off x="325530" y="1759827"/>
-            <a:ext cx="4642509" cy="3624973"/>
+            <a:off x="515566" y="1951173"/>
+            <a:ext cx="4279764" cy="3261796"/>
           </a:xfrm>
           <a:prstGeom prst="rect">
             <a:avLst/>
@@ -7792,7 +7792,7 @@
           <a:p>
             <a:r>
               <a:rPr lang="en-US" dirty="0"/>
-              <a:t>Wait until the color sensor sees red</a:t>
+              <a:t>Wait until the color sensor sees black</a:t>
             </a:r>
           </a:p>
         </p:txBody>
@@ -7931,7 +7931,7 @@
           <a:effectLst/>
           <a:extLst>
             <a:ext uri="{91240B29-F687-4f45-9708-019B960494DF}">
-              <a14:hiddenLine xmlns:a14="http://schemas.microsoft.com/office/drawing/2010/main" xmlns="" w="9525">
+              <a14:hiddenLine xmlns="" xmlns:a14="http://schemas.microsoft.com/office/drawing/2010/main" w="9525">
                 <a:solidFill>
                   <a:schemeClr val="tx1"/>
                 </a:solidFill>
@@ -7941,7 +7941,7 @@
               </a14:hiddenLine>
             </a:ext>
             <a:ext uri="{AF507438-7753-43e0-B8FC-AC1667EBCBE1}">
-              <a14:hiddenEffects xmlns:a14="http://schemas.microsoft.com/office/drawing/2010/main" xmlns="">
+              <a14:hiddenEffects xmlns="" xmlns:a14="http://schemas.microsoft.com/office/drawing/2010/main">
                 <a:effectLst>
                   <a:outerShdw dist="35921" dir="2700000" algn="ctr" rotWithShape="0">
                     <a:schemeClr val="bg2"/>
@@ -8282,7 +8282,7 @@
           <a:noFill/>
           <a:extLst>
             <a:ext uri="{909E8E84-426E-40dd-AFC4-6F175D3DCCD1}">
-              <a14:hiddenFill xmlns:a14="http://schemas.microsoft.com/office/drawing/2010/main" xmlns="">
+              <a14:hiddenFill xmlns="" xmlns:a14="http://schemas.microsoft.com/office/drawing/2010/main">
                 <a:solidFill>
                   <a:srgbClr val="FFFFFF"/>
                 </a:solidFill>

</xml_diff>